<commit_message>
07/09 ready for meeting
</commit_message>
<xml_diff>
--- a/zs_sim_robot/meeting_0709/meeting_0709.pptx
+++ b/zs_sim_robot/meeting_0709/meeting_0709.pptx
@@ -3428,14 +3428,14 @@
             <a:pPr marL="0" indent="0">
               <a:buNone/>
             </a:pPr>
-            <a:endParaRPr lang="en-US" dirty="0"/>
+            <a:endParaRPr lang="en-US" sz="2800" dirty="0"/>
           </a:p>
           <a:p>
             <a:pPr marL="0" indent="0">
               <a:buNone/>
             </a:pPr>
             <a:r>
-              <a:rPr lang="en-US" dirty="0"/>
+              <a:rPr lang="en-US" sz="2800" dirty="0"/>
               <a:t>1) PPO for real hand: Done</a:t>
             </a:r>
           </a:p>
@@ -3444,7 +3444,7 @@
               <a:buNone/>
             </a:pPr>
             <a:r>
-              <a:rPr lang="en-US" dirty="0"/>
+              <a:rPr lang="en-US" sz="2800" dirty="0"/>
               <a:t>2) Clean and wrapped codes so far + managed experiment's logistic: Done</a:t>
             </a:r>
           </a:p>
@@ -3453,23 +3453,23 @@
               <a:buNone/>
             </a:pPr>
             <a:r>
-              <a:rPr lang="en-US" dirty="0"/>
+              <a:rPr lang="en-US" sz="2800" dirty="0"/>
               <a:t>3) 10 rollouts for A* and PPO on </a:t>
             </a:r>
             <a:r>
-              <a:rPr lang="en-US" dirty="0" err="1"/>
+              <a:rPr lang="en-US" sz="2800" dirty="0" err="1"/>
               <a:t>reacher</a:t>
             </a:r>
             <a:r>
-              <a:rPr lang="en-US" dirty="0"/>
+              <a:rPr lang="en-US" sz="2800" dirty="0"/>
               <a:t> and </a:t>
             </a:r>
             <a:r>
-              <a:rPr lang="en-US" dirty="0" err="1"/>
+              <a:rPr lang="en-US" sz="2800" dirty="0" err="1"/>
               <a:t>acrobot</a:t>
             </a:r>
             <a:r>
-              <a:rPr lang="en-US" dirty="0"/>
+              <a:rPr lang="en-US" sz="2800" dirty="0"/>
               <a:t>: Done</a:t>
             </a:r>
           </a:p>
@@ -3478,7 +3478,7 @@
               <a:buNone/>
             </a:pPr>
             <a:r>
-              <a:rPr lang="en-US" dirty="0"/>
+              <a:rPr lang="en-US" sz="2800" dirty="0"/>
               <a:t>4) 10 rollouts for gazebo: Done (on my own machine, 14 hours)</a:t>
             </a:r>
           </a:p>
@@ -3487,7 +3487,7 @@
               <a:buNone/>
             </a:pPr>
             <a:r>
-              <a:rPr lang="en-US" dirty="0"/>
+              <a:rPr lang="en-US" sz="2800" dirty="0"/>
               <a:t>5) Got all statistics: Done</a:t>
             </a:r>
           </a:p>
@@ -3496,19 +3496,19 @@
               <a:buNone/>
             </a:pPr>
             <a:r>
-              <a:rPr lang="en-US" dirty="0"/>
+              <a:rPr lang="en-US" sz="2800" dirty="0"/>
               <a:t>6) </a:t>
             </a:r>
             <a:r>
-              <a:rPr lang="en-US" u="sng" dirty="0"/>
+              <a:rPr lang="en-US" sz="2800" u="sng" dirty="0"/>
               <a:t>Write rollout </a:t>
             </a:r>
             <a:r>
-              <a:rPr lang="en-US" u="sng" dirty="0" err="1"/>
+              <a:rPr lang="en-US" sz="2800" u="sng" dirty="0" err="1"/>
               <a:t>ros</a:t>
             </a:r>
             <a:r>
-              <a:rPr lang="en-US" u="sng" dirty="0"/>
+              <a:rPr lang="en-US" sz="2800" u="sng" dirty="0"/>
               <a:t> package codes for real hand: Just to start</a:t>
             </a:r>
           </a:p>
@@ -3516,7 +3516,7 @@
             <a:pPr marL="0" indent="0">
               <a:buNone/>
             </a:pPr>
-            <a:endParaRPr lang="en-US" dirty="0"/>
+            <a:endParaRPr lang="en-US" sz="2800" dirty="0"/>
           </a:p>
         </p:txBody>
       </p:sp>

</xml_diff>